<commit_message>
piccole modifiche alle presentazioni
</commit_message>
<xml_diff>
--- a/Presentations/Presentation_Ass1.pptx
+++ b/Presentations/Presentation_Ass1.pptx
@@ -848,7 +848,7 @@
           <a:p>
             <a:fld id="{B15EC6F6-30F3-41A1-B385-9CB91ECF5BF1}" type="datetimeFigureOut">
               <a:rPr lang="it-IT" smtClean="0"/>
-              <a:t>23/04/2022</a:t>
+              <a:t>03/05/2022</a:t>
             </a:fld>
             <a:endParaRPr lang="it-IT"/>
           </a:p>
@@ -1099,7 +1099,7 @@
           <a:p>
             <a:fld id="{B15EC6F6-30F3-41A1-B385-9CB91ECF5BF1}" type="datetimeFigureOut">
               <a:rPr lang="it-IT" smtClean="0"/>
-              <a:t>23/04/2022</a:t>
+              <a:t>03/05/2022</a:t>
             </a:fld>
             <a:endParaRPr lang="it-IT"/>
           </a:p>
@@ -1413,7 +1413,7 @@
           <a:p>
             <a:fld id="{B15EC6F6-30F3-41A1-B385-9CB91ECF5BF1}" type="datetimeFigureOut">
               <a:rPr lang="it-IT" smtClean="0"/>
-              <a:t>23/04/2022</a:t>
+              <a:t>03/05/2022</a:t>
             </a:fld>
             <a:endParaRPr lang="it-IT"/>
           </a:p>
@@ -1754,7 +1754,7 @@
           <a:p>
             <a:fld id="{B15EC6F6-30F3-41A1-B385-9CB91ECF5BF1}" type="datetimeFigureOut">
               <a:rPr lang="it-IT" smtClean="0"/>
-              <a:t>23/04/2022</a:t>
+              <a:t>03/05/2022</a:t>
             </a:fld>
             <a:endParaRPr lang="it-IT"/>
           </a:p>
@@ -2068,7 +2068,7 @@
           <a:p>
             <a:fld id="{B15EC6F6-30F3-41A1-B385-9CB91ECF5BF1}" type="datetimeFigureOut">
               <a:rPr lang="it-IT" smtClean="0"/>
-              <a:t>23/04/2022</a:t>
+              <a:t>03/05/2022</a:t>
             </a:fld>
             <a:endParaRPr lang="it-IT"/>
           </a:p>
@@ -2461,7 +2461,7 @@
           <a:p>
             <a:fld id="{B15EC6F6-30F3-41A1-B385-9CB91ECF5BF1}" type="datetimeFigureOut">
               <a:rPr lang="it-IT" smtClean="0"/>
-              <a:t>23/04/2022</a:t>
+              <a:t>03/05/2022</a:t>
             </a:fld>
             <a:endParaRPr lang="it-IT"/>
           </a:p>
@@ -2631,7 +2631,7 @@
           <a:p>
             <a:fld id="{B15EC6F6-30F3-41A1-B385-9CB91ECF5BF1}" type="datetimeFigureOut">
               <a:rPr lang="it-IT" smtClean="0"/>
-              <a:t>23/04/2022</a:t>
+              <a:t>03/05/2022</a:t>
             </a:fld>
             <a:endParaRPr lang="it-IT"/>
           </a:p>
@@ -2811,7 +2811,7 @@
           <a:p>
             <a:fld id="{B15EC6F6-30F3-41A1-B385-9CB91ECF5BF1}" type="datetimeFigureOut">
               <a:rPr lang="it-IT" smtClean="0"/>
-              <a:t>23/04/2022</a:t>
+              <a:t>03/05/2022</a:t>
             </a:fld>
             <a:endParaRPr lang="it-IT"/>
           </a:p>
@@ -3098,7 +3098,7 @@
           <a:p>
             <a:fld id="{B15EC6F6-30F3-41A1-B385-9CB91ECF5BF1}" type="datetimeFigureOut">
               <a:rPr lang="it-IT" smtClean="0"/>
-              <a:t>23/04/2022</a:t>
+              <a:t>03/05/2022</a:t>
             </a:fld>
             <a:endParaRPr lang="it-IT"/>
           </a:p>
@@ -3310,7 +3310,7 @@
           <a:p>
             <a:fld id="{B15EC6F6-30F3-41A1-B385-9CB91ECF5BF1}" type="datetimeFigureOut">
               <a:rPr lang="it-IT" smtClean="0"/>
-              <a:t>23/04/2022</a:t>
+              <a:t>03/05/2022</a:t>
             </a:fld>
             <a:endParaRPr lang="it-IT"/>
           </a:p>
@@ -3653,7 +3653,7 @@
           <a:p>
             <a:fld id="{B15EC6F6-30F3-41A1-B385-9CB91ECF5BF1}" type="datetimeFigureOut">
               <a:rPr lang="it-IT" smtClean="0"/>
-              <a:t>23/04/2022</a:t>
+              <a:t>03/05/2022</a:t>
             </a:fld>
             <a:endParaRPr lang="it-IT"/>
           </a:p>
@@ -3867,7 +3867,7 @@
           <a:p>
             <a:fld id="{B15EC6F6-30F3-41A1-B385-9CB91ECF5BF1}" type="datetimeFigureOut">
               <a:rPr lang="it-IT" smtClean="0"/>
-              <a:t>23/04/2022</a:t>
+              <a:t>03/05/2022</a:t>
             </a:fld>
             <a:endParaRPr lang="it-IT"/>
           </a:p>
@@ -4104,7 +4104,7 @@
           <a:p>
             <a:fld id="{B15EC6F6-30F3-41A1-B385-9CB91ECF5BF1}" type="datetimeFigureOut">
               <a:rPr lang="it-IT" smtClean="0"/>
-              <a:t>23/04/2022</a:t>
+              <a:t>03/05/2022</a:t>
             </a:fld>
             <a:endParaRPr lang="it-IT"/>
           </a:p>
@@ -4483,7 +4483,7 @@
           <a:p>
             <a:fld id="{B15EC6F6-30F3-41A1-B385-9CB91ECF5BF1}" type="datetimeFigureOut">
               <a:rPr lang="it-IT" smtClean="0"/>
-              <a:t>23/04/2022</a:t>
+              <a:t>03/05/2022</a:t>
             </a:fld>
             <a:endParaRPr lang="it-IT"/>
           </a:p>
@@ -4601,7 +4601,7 @@
           <a:p>
             <a:fld id="{B15EC6F6-30F3-41A1-B385-9CB91ECF5BF1}" type="datetimeFigureOut">
               <a:rPr lang="it-IT" smtClean="0"/>
-              <a:t>23/04/2022</a:t>
+              <a:t>03/05/2022</a:t>
             </a:fld>
             <a:endParaRPr lang="it-IT"/>
           </a:p>
@@ -4772,7 +4772,7 @@
           <a:p>
             <a:fld id="{B15EC6F6-30F3-41A1-B385-9CB91ECF5BF1}" type="datetimeFigureOut">
               <a:rPr lang="it-IT" smtClean="0"/>
-              <a:t>23/04/2022</a:t>
+              <a:t>03/05/2022</a:t>
             </a:fld>
             <a:endParaRPr lang="it-IT"/>
           </a:p>
@@ -5126,7 +5126,7 @@
           <a:p>
             <a:fld id="{B15EC6F6-30F3-41A1-B385-9CB91ECF5BF1}" type="datetimeFigureOut">
               <a:rPr lang="it-IT" smtClean="0"/>
-              <a:t>23/04/2022</a:t>
+              <a:t>03/05/2022</a:t>
             </a:fld>
             <a:endParaRPr lang="it-IT"/>
           </a:p>
@@ -5508,7 +5508,7 @@
           <a:p>
             <a:fld id="{B15EC6F6-30F3-41A1-B385-9CB91ECF5BF1}" type="datetimeFigureOut">
               <a:rPr lang="it-IT" smtClean="0"/>
-              <a:t>23/04/2022</a:t>
+              <a:t>03/05/2022</a:t>
             </a:fld>
             <a:endParaRPr lang="it-IT"/>
           </a:p>
@@ -5678,7 +5678,7 @@
           <a:p>
             <a:fld id="{B15EC6F6-30F3-41A1-B385-9CB91ECF5BF1}" type="datetimeFigureOut">
               <a:rPr lang="it-IT" smtClean="0"/>
-              <a:t>23/04/2022</a:t>
+              <a:t>03/05/2022</a:t>
             </a:fld>
             <a:endParaRPr lang="it-IT"/>
           </a:p>
@@ -5934,7 +5934,7 @@
           <a:p>
             <a:fld id="{B15EC6F6-30F3-41A1-B385-9CB91ECF5BF1}" type="datetimeFigureOut">
               <a:rPr lang="it-IT" smtClean="0"/>
-              <a:t>23/04/2022</a:t>
+              <a:t>03/05/2022</a:t>
             </a:fld>
             <a:endParaRPr lang="it-IT"/>
           </a:p>
@@ -6181,7 +6181,7 @@
           <a:p>
             <a:fld id="{B15EC6F6-30F3-41A1-B385-9CB91ECF5BF1}" type="datetimeFigureOut">
               <a:rPr lang="it-IT" smtClean="0"/>
-              <a:t>23/04/2022</a:t>
+              <a:t>03/05/2022</a:t>
             </a:fld>
             <a:endParaRPr lang="it-IT"/>
           </a:p>
@@ -6413,7 +6413,7 @@
           <a:p>
             <a:fld id="{B15EC6F6-30F3-41A1-B385-9CB91ECF5BF1}" type="datetimeFigureOut">
               <a:rPr lang="it-IT" smtClean="0"/>
-              <a:t>23/04/2022</a:t>
+              <a:t>03/05/2022</a:t>
             </a:fld>
             <a:endParaRPr lang="it-IT"/>
           </a:p>
@@ -6787,7 +6787,7 @@
           <a:p>
             <a:fld id="{B15EC6F6-30F3-41A1-B385-9CB91ECF5BF1}" type="datetimeFigureOut">
               <a:rPr lang="it-IT" smtClean="0"/>
-              <a:t>23/04/2022</a:t>
+              <a:t>03/05/2022</a:t>
             </a:fld>
             <a:endParaRPr lang="it-IT"/>
           </a:p>
@@ -6910,7 +6910,7 @@
           <a:p>
             <a:fld id="{B15EC6F6-30F3-41A1-B385-9CB91ECF5BF1}" type="datetimeFigureOut">
               <a:rPr lang="it-IT" smtClean="0"/>
-              <a:t>23/04/2022</a:t>
+              <a:t>03/05/2022</a:t>
             </a:fld>
             <a:endParaRPr lang="it-IT"/>
           </a:p>
@@ -7005,7 +7005,7 @@
           <a:p>
             <a:fld id="{B15EC6F6-30F3-41A1-B385-9CB91ECF5BF1}" type="datetimeFigureOut">
               <a:rPr lang="it-IT" smtClean="0"/>
-              <a:t>23/04/2022</a:t>
+              <a:t>03/05/2022</a:t>
             </a:fld>
             <a:endParaRPr lang="it-IT"/>
           </a:p>
@@ -7260,7 +7260,7 @@
           <a:p>
             <a:fld id="{B15EC6F6-30F3-41A1-B385-9CB91ECF5BF1}" type="datetimeFigureOut">
               <a:rPr lang="it-IT" smtClean="0"/>
-              <a:t>23/04/2022</a:t>
+              <a:t>03/05/2022</a:t>
             </a:fld>
             <a:endParaRPr lang="it-IT"/>
           </a:p>
@@ -7523,7 +7523,7 @@
           <a:p>
             <a:fld id="{B15EC6F6-30F3-41A1-B385-9CB91ECF5BF1}" type="datetimeFigureOut">
               <a:rPr lang="it-IT" smtClean="0"/>
-              <a:t>23/04/2022</a:t>
+              <a:t>03/05/2022</a:t>
             </a:fld>
             <a:endParaRPr lang="it-IT"/>
           </a:p>
@@ -8266,7 +8266,7 @@
           <a:p>
             <a:fld id="{B15EC6F6-30F3-41A1-B385-9CB91ECF5BF1}" type="datetimeFigureOut">
               <a:rPr lang="it-IT" smtClean="0"/>
-              <a:t>23/04/2022</a:t>
+              <a:t>03/05/2022</a:t>
             </a:fld>
             <a:endParaRPr lang="it-IT"/>
           </a:p>
@@ -8999,7 +8999,7 @@
           <a:p>
             <a:fld id="{B15EC6F6-30F3-41A1-B385-9CB91ECF5BF1}" type="datetimeFigureOut">
               <a:rPr lang="it-IT" smtClean="0"/>
-              <a:t>23/04/2022</a:t>
+              <a:t>03/05/2022</a:t>
             </a:fld>
             <a:endParaRPr lang="it-IT"/>
           </a:p>
@@ -10378,15 +10378,15 @@
                   <a:schemeClr val="tx1"/>
                 </a:solidFill>
               </a:rPr>
-              <a:t>Non associative setting</a:t>
-            </a:r>
-            <a:r>
-              <a:rPr lang="it-IT" dirty="0">
+              <a:t>Non </a:t>
+            </a:r>
+            <a:r>
+              <a:rPr lang="it-IT" b="1">
                 <a:solidFill>
                   <a:schemeClr val="tx1"/>
                 </a:solidFill>
               </a:rPr>
-              <a:t>, non abbiamo un concetto di stato </a:t>
+              <a:t>associative setting</a:t>
             </a:r>
             <a:br>
               <a:rPr lang="it-IT" dirty="0">

</xml_diff>